<commit_message>
minor changes and typo
</commit_message>
<xml_diff>
--- a/rulebook_files/Swayamsiddha HackathonTemplate.pptx
+++ b/rulebook_files/Swayamsiddha HackathonTemplate.pptx
@@ -5,12 +5,13 @@
     <p:sldMasterId id="2147483684" r:id="rId1"/>
   </p:sldMasterIdLst>
   <p:notesMasterIdLst>
-    <p:notesMasterId r:id="rId5"/>
+    <p:notesMasterId r:id="rId6"/>
   </p:notesMasterIdLst>
   <p:sldIdLst>
     <p:sldId id="268" r:id="rId2"/>
     <p:sldId id="269" r:id="rId3"/>
     <p:sldId id="270" r:id="rId4"/>
+    <p:sldId id="271" r:id="rId5"/>
   </p:sldIdLst>
   <p:sldSz cx="9144000" cy="6858000" type="screen4x3"/>
   <p:notesSz cx="6858000" cy="9144000"/>
@@ -109,6 +110,22 @@
       </a:defRPr>
     </a:lvl9pPr>
   </p:defaultTextStyle>
+  <p:extLst>
+    <p:ext uri="{EFAFB233-063F-42B5-8137-9DF3F51BA10A}">
+      <p15:sldGuideLst xmlns:p15="http://schemas.microsoft.com/office/powerpoint/2012/main">
+        <p15:guide id="1" orient="horz" pos="2160">
+          <p15:clr>
+            <a:srgbClr val="A4A3A4"/>
+          </p15:clr>
+        </p15:guide>
+        <p15:guide id="2" pos="2880">
+          <p15:clr>
+            <a:srgbClr val="A4A3A4"/>
+          </p15:clr>
+        </p15:guide>
+      </p15:sldGuideLst>
+    </p:ext>
+  </p:extLst>
 </p:presentation>
 </file>
 
@@ -290,35 +307,35 @@
           <a:p>
             <a:pPr lvl="0"/>
             <a:r>
-              <a:rPr lang="en-US" smtClean="0"/>
+              <a:rPr lang="en-US"/>
               <a:t>Click to edit Master text styles</a:t>
             </a:r>
           </a:p>
           <a:p>
             <a:pPr lvl="1"/>
             <a:r>
-              <a:rPr lang="en-US" smtClean="0"/>
+              <a:rPr lang="en-US"/>
               <a:t>Second level</a:t>
             </a:r>
           </a:p>
           <a:p>
             <a:pPr lvl="2"/>
             <a:r>
-              <a:rPr lang="en-US" smtClean="0"/>
+              <a:rPr lang="en-US"/>
               <a:t>Third level</a:t>
             </a:r>
           </a:p>
           <a:p>
             <a:pPr lvl="3"/>
             <a:r>
-              <a:rPr lang="en-US" smtClean="0"/>
+              <a:rPr lang="en-US"/>
               <a:t>Fourth level</a:t>
             </a:r>
           </a:p>
           <a:p>
             <a:pPr lvl="4"/>
             <a:r>
-              <a:rPr lang="en-US" smtClean="0"/>
+              <a:rPr lang="en-US"/>
               <a:t>Fifth level</a:t>
             </a:r>
           </a:p>
@@ -581,10 +598,9 @@
           <a:lstStyle/>
           <a:p>
             <a:r>
-              <a:rPr lang="en-US" smtClean="0"/>
+              <a:rPr lang="en-US"/>
               <a:t>Click to edit Master title style</a:t>
             </a:r>
-            <a:endParaRPr lang="en-US"/>
           </a:p>
         </p:txBody>
       </p:sp>
@@ -700,10 +716,9 @@
           </a:lstStyle>
           <a:p>
             <a:r>
-              <a:rPr lang="en-US" smtClean="0"/>
+              <a:rPr lang="en-US"/>
               <a:t>Click to edit Master subtitle style</a:t>
             </a:r>
-            <a:endParaRPr lang="en-US"/>
           </a:p>
         </p:txBody>
       </p:sp>
@@ -725,7 +740,7 @@
             <a:fld id="{1D8BD707-D9CF-40AE-B4C6-C98DA3205C09}" type="datetimeFigureOut">
               <a:rPr lang="en-US" smtClean="0"/>
               <a:pPr/>
-              <a:t>30/07/2020</a:t>
+              <a:t>8/7/2020</a:t>
             </a:fld>
             <a:endParaRPr lang="en-US"/>
           </a:p>
@@ -815,10 +830,9 @@
           <a:lstStyle/>
           <a:p>
             <a:r>
-              <a:rPr lang="en-US" smtClean="0"/>
+              <a:rPr lang="en-US"/>
               <a:t>Click to edit Master title style</a:t>
             </a:r>
-            <a:endParaRPr lang="en-US"/>
           </a:p>
         </p:txBody>
       </p:sp>
@@ -839,38 +853,37 @@
           <a:p>
             <a:pPr lvl="0"/>
             <a:r>
-              <a:rPr lang="en-US" smtClean="0"/>
+              <a:rPr lang="en-US"/>
               <a:t>Click to edit Master text styles</a:t>
             </a:r>
           </a:p>
           <a:p>
             <a:pPr lvl="1"/>
             <a:r>
-              <a:rPr lang="en-US" smtClean="0"/>
+              <a:rPr lang="en-US"/>
               <a:t>Second level</a:t>
             </a:r>
           </a:p>
           <a:p>
             <a:pPr lvl="2"/>
             <a:r>
-              <a:rPr lang="en-US" smtClean="0"/>
+              <a:rPr lang="en-US"/>
               <a:t>Third level</a:t>
             </a:r>
           </a:p>
           <a:p>
             <a:pPr lvl="3"/>
             <a:r>
-              <a:rPr lang="en-US" smtClean="0"/>
+              <a:rPr lang="en-US"/>
               <a:t>Fourth level</a:t>
             </a:r>
           </a:p>
           <a:p>
             <a:pPr lvl="4"/>
             <a:r>
-              <a:rPr lang="en-US" smtClean="0"/>
+              <a:rPr lang="en-US"/>
               <a:t>Fifth level</a:t>
             </a:r>
-            <a:endParaRPr lang="en-US"/>
           </a:p>
         </p:txBody>
       </p:sp>
@@ -892,7 +905,7 @@
             <a:fld id="{1D8BD707-D9CF-40AE-B4C6-C98DA3205C09}" type="datetimeFigureOut">
               <a:rPr lang="en-US" smtClean="0"/>
               <a:pPr/>
-              <a:t>30/07/2020</a:t>
+              <a:t>8/7/2020</a:t>
             </a:fld>
             <a:endParaRPr lang="en-US"/>
           </a:p>
@@ -987,10 +1000,9 @@
           <a:lstStyle/>
           <a:p>
             <a:r>
-              <a:rPr lang="en-US" smtClean="0"/>
+              <a:rPr lang="en-US"/>
               <a:t>Click to edit Master title style</a:t>
             </a:r>
-            <a:endParaRPr lang="en-US"/>
           </a:p>
         </p:txBody>
       </p:sp>
@@ -1016,38 +1028,37 @@
           <a:p>
             <a:pPr lvl="0"/>
             <a:r>
-              <a:rPr lang="en-US" smtClean="0"/>
+              <a:rPr lang="en-US"/>
               <a:t>Click to edit Master text styles</a:t>
             </a:r>
           </a:p>
           <a:p>
             <a:pPr lvl="1"/>
             <a:r>
-              <a:rPr lang="en-US" smtClean="0"/>
+              <a:rPr lang="en-US"/>
               <a:t>Second level</a:t>
             </a:r>
           </a:p>
           <a:p>
             <a:pPr lvl="2"/>
             <a:r>
-              <a:rPr lang="en-US" smtClean="0"/>
+              <a:rPr lang="en-US"/>
               <a:t>Third level</a:t>
             </a:r>
           </a:p>
           <a:p>
             <a:pPr lvl="3"/>
             <a:r>
-              <a:rPr lang="en-US" smtClean="0"/>
+              <a:rPr lang="en-US"/>
               <a:t>Fourth level</a:t>
             </a:r>
           </a:p>
           <a:p>
             <a:pPr lvl="4"/>
             <a:r>
-              <a:rPr lang="en-US" smtClean="0"/>
+              <a:rPr lang="en-US"/>
               <a:t>Fifth level</a:t>
             </a:r>
-            <a:endParaRPr lang="en-US"/>
           </a:p>
         </p:txBody>
       </p:sp>
@@ -1069,7 +1080,7 @@
             <a:fld id="{1D8BD707-D9CF-40AE-B4C6-C98DA3205C09}" type="datetimeFigureOut">
               <a:rPr lang="en-US" smtClean="0"/>
               <a:pPr/>
-              <a:t>30/07/2020</a:t>
+              <a:t>8/7/2020</a:t>
             </a:fld>
             <a:endParaRPr lang="en-US"/>
           </a:p>
@@ -1159,10 +1170,9 @@
           <a:lstStyle/>
           <a:p>
             <a:r>
-              <a:rPr lang="en-US" smtClean="0"/>
+              <a:rPr lang="en-US"/>
               <a:t>Click to edit Master title style</a:t>
             </a:r>
-            <a:endParaRPr lang="en-US"/>
           </a:p>
         </p:txBody>
       </p:sp>
@@ -1183,38 +1193,37 @@
           <a:p>
             <a:pPr lvl="0"/>
             <a:r>
-              <a:rPr lang="en-US" smtClean="0"/>
+              <a:rPr lang="en-US"/>
               <a:t>Click to edit Master text styles</a:t>
             </a:r>
           </a:p>
           <a:p>
             <a:pPr lvl="1"/>
             <a:r>
-              <a:rPr lang="en-US" smtClean="0"/>
+              <a:rPr lang="en-US"/>
               <a:t>Second level</a:t>
             </a:r>
           </a:p>
           <a:p>
             <a:pPr lvl="2"/>
             <a:r>
-              <a:rPr lang="en-US" smtClean="0"/>
+              <a:rPr lang="en-US"/>
               <a:t>Third level</a:t>
             </a:r>
           </a:p>
           <a:p>
             <a:pPr lvl="3"/>
             <a:r>
-              <a:rPr lang="en-US" smtClean="0"/>
+              <a:rPr lang="en-US"/>
               <a:t>Fourth level</a:t>
             </a:r>
           </a:p>
           <a:p>
             <a:pPr lvl="4"/>
             <a:r>
-              <a:rPr lang="en-US" smtClean="0"/>
+              <a:rPr lang="en-US"/>
               <a:t>Fifth level</a:t>
             </a:r>
-            <a:endParaRPr lang="en-US"/>
           </a:p>
         </p:txBody>
       </p:sp>
@@ -1236,7 +1245,7 @@
             <a:fld id="{1D8BD707-D9CF-40AE-B4C6-C98DA3205C09}" type="datetimeFigureOut">
               <a:rPr lang="en-US" smtClean="0"/>
               <a:pPr/>
-              <a:t>30/07/2020</a:t>
+              <a:t>8/7/2020</a:t>
             </a:fld>
             <a:endParaRPr lang="en-US"/>
           </a:p>
@@ -1335,10 +1344,9 @@
           </a:lstStyle>
           <a:p>
             <a:r>
-              <a:rPr lang="en-US" smtClean="0"/>
+              <a:rPr lang="en-US"/>
               <a:t>Click to edit Master title style</a:t>
             </a:r>
-            <a:endParaRPr lang="en-US"/>
           </a:p>
         </p:txBody>
       </p:sp>
@@ -1455,7 +1463,7 @@
           <a:p>
             <a:pPr lvl="0"/>
             <a:r>
-              <a:rPr lang="en-US" smtClean="0"/>
+              <a:rPr lang="en-US"/>
               <a:t>Click to edit Master text styles</a:t>
             </a:r>
           </a:p>
@@ -1479,7 +1487,7 @@
             <a:fld id="{1D8BD707-D9CF-40AE-B4C6-C98DA3205C09}" type="datetimeFigureOut">
               <a:rPr lang="en-US" smtClean="0"/>
               <a:pPr/>
-              <a:t>30/07/2020</a:t>
+              <a:t>8/7/2020</a:t>
             </a:fld>
             <a:endParaRPr lang="en-US"/>
           </a:p>
@@ -1569,10 +1577,9 @@
           <a:lstStyle/>
           <a:p>
             <a:r>
-              <a:rPr lang="en-US" smtClean="0"/>
+              <a:rPr lang="en-US"/>
               <a:t>Click to edit Master title style</a:t>
             </a:r>
-            <a:endParaRPr lang="en-US"/>
           </a:p>
         </p:txBody>
       </p:sp>
@@ -1626,38 +1633,37 @@
           <a:p>
             <a:pPr lvl="0"/>
             <a:r>
-              <a:rPr lang="en-US" smtClean="0"/>
+              <a:rPr lang="en-US"/>
               <a:t>Click to edit Master text styles</a:t>
             </a:r>
           </a:p>
           <a:p>
             <a:pPr lvl="1"/>
             <a:r>
-              <a:rPr lang="en-US" smtClean="0"/>
+              <a:rPr lang="en-US"/>
               <a:t>Second level</a:t>
             </a:r>
           </a:p>
           <a:p>
             <a:pPr lvl="2"/>
             <a:r>
-              <a:rPr lang="en-US" smtClean="0"/>
+              <a:rPr lang="en-US"/>
               <a:t>Third level</a:t>
             </a:r>
           </a:p>
           <a:p>
             <a:pPr lvl="3"/>
             <a:r>
-              <a:rPr lang="en-US" smtClean="0"/>
+              <a:rPr lang="en-US"/>
               <a:t>Fourth level</a:t>
             </a:r>
           </a:p>
           <a:p>
             <a:pPr lvl="4"/>
             <a:r>
-              <a:rPr lang="en-US" smtClean="0"/>
+              <a:rPr lang="en-US"/>
               <a:t>Fifth level</a:t>
             </a:r>
-            <a:endParaRPr lang="en-US"/>
           </a:p>
         </p:txBody>
       </p:sp>
@@ -1711,38 +1717,37 @@
           <a:p>
             <a:pPr lvl="0"/>
             <a:r>
-              <a:rPr lang="en-US" smtClean="0"/>
+              <a:rPr lang="en-US"/>
               <a:t>Click to edit Master text styles</a:t>
             </a:r>
           </a:p>
           <a:p>
             <a:pPr lvl="1"/>
             <a:r>
-              <a:rPr lang="en-US" smtClean="0"/>
+              <a:rPr lang="en-US"/>
               <a:t>Second level</a:t>
             </a:r>
           </a:p>
           <a:p>
             <a:pPr lvl="2"/>
             <a:r>
-              <a:rPr lang="en-US" smtClean="0"/>
+              <a:rPr lang="en-US"/>
               <a:t>Third level</a:t>
             </a:r>
           </a:p>
           <a:p>
             <a:pPr lvl="3"/>
             <a:r>
-              <a:rPr lang="en-US" smtClean="0"/>
+              <a:rPr lang="en-US"/>
               <a:t>Fourth level</a:t>
             </a:r>
           </a:p>
           <a:p>
             <a:pPr lvl="4"/>
             <a:r>
-              <a:rPr lang="en-US" smtClean="0"/>
+              <a:rPr lang="en-US"/>
               <a:t>Fifth level</a:t>
             </a:r>
-            <a:endParaRPr lang="en-US"/>
           </a:p>
         </p:txBody>
       </p:sp>
@@ -1764,7 +1769,7 @@
             <a:fld id="{1D8BD707-D9CF-40AE-B4C6-C98DA3205C09}" type="datetimeFigureOut">
               <a:rPr lang="en-US" smtClean="0"/>
               <a:pPr/>
-              <a:t>30/07/2020</a:t>
+              <a:t>8/7/2020</a:t>
             </a:fld>
             <a:endParaRPr lang="en-US"/>
           </a:p>
@@ -1854,10 +1859,9 @@
           <a:lstStyle/>
           <a:p>
             <a:r>
-              <a:rPr lang="en-US" smtClean="0"/>
+              <a:rPr lang="en-US"/>
               <a:t>Click to edit Master title style</a:t>
             </a:r>
-            <a:endParaRPr lang="en-US"/>
           </a:p>
         </p:txBody>
       </p:sp>
@@ -1920,7 +1924,7 @@
           <a:p>
             <a:pPr lvl="0"/>
             <a:r>
-              <a:rPr lang="en-US" smtClean="0"/>
+              <a:rPr lang="en-US"/>
               <a:t>Click to edit Master text styles</a:t>
             </a:r>
           </a:p>
@@ -1976,38 +1980,37 @@
           <a:p>
             <a:pPr lvl="0"/>
             <a:r>
-              <a:rPr lang="en-US" smtClean="0"/>
+              <a:rPr lang="en-US"/>
               <a:t>Click to edit Master text styles</a:t>
             </a:r>
           </a:p>
           <a:p>
             <a:pPr lvl="1"/>
             <a:r>
-              <a:rPr lang="en-US" smtClean="0"/>
+              <a:rPr lang="en-US"/>
               <a:t>Second level</a:t>
             </a:r>
           </a:p>
           <a:p>
             <a:pPr lvl="2"/>
             <a:r>
-              <a:rPr lang="en-US" smtClean="0"/>
+              <a:rPr lang="en-US"/>
               <a:t>Third level</a:t>
             </a:r>
           </a:p>
           <a:p>
             <a:pPr lvl="3"/>
             <a:r>
-              <a:rPr lang="en-US" smtClean="0"/>
+              <a:rPr lang="en-US"/>
               <a:t>Fourth level</a:t>
             </a:r>
           </a:p>
           <a:p>
             <a:pPr lvl="4"/>
             <a:r>
-              <a:rPr lang="en-US" smtClean="0"/>
+              <a:rPr lang="en-US"/>
               <a:t>Fifth level</a:t>
             </a:r>
-            <a:endParaRPr lang="en-US"/>
           </a:p>
         </p:txBody>
       </p:sp>
@@ -2070,7 +2073,7 @@
           <a:p>
             <a:pPr lvl="0"/>
             <a:r>
-              <a:rPr lang="en-US" smtClean="0"/>
+              <a:rPr lang="en-US"/>
               <a:t>Click to edit Master text styles</a:t>
             </a:r>
           </a:p>
@@ -2126,38 +2129,37 @@
           <a:p>
             <a:pPr lvl="0"/>
             <a:r>
-              <a:rPr lang="en-US" smtClean="0"/>
+              <a:rPr lang="en-US"/>
               <a:t>Click to edit Master text styles</a:t>
             </a:r>
           </a:p>
           <a:p>
             <a:pPr lvl="1"/>
             <a:r>
-              <a:rPr lang="en-US" smtClean="0"/>
+              <a:rPr lang="en-US"/>
               <a:t>Second level</a:t>
             </a:r>
           </a:p>
           <a:p>
             <a:pPr lvl="2"/>
             <a:r>
-              <a:rPr lang="en-US" smtClean="0"/>
+              <a:rPr lang="en-US"/>
               <a:t>Third level</a:t>
             </a:r>
           </a:p>
           <a:p>
             <a:pPr lvl="3"/>
             <a:r>
-              <a:rPr lang="en-US" smtClean="0"/>
+              <a:rPr lang="en-US"/>
               <a:t>Fourth level</a:t>
             </a:r>
           </a:p>
           <a:p>
             <a:pPr lvl="4"/>
             <a:r>
-              <a:rPr lang="en-US" smtClean="0"/>
+              <a:rPr lang="en-US"/>
               <a:t>Fifth level</a:t>
             </a:r>
-            <a:endParaRPr lang="en-US"/>
           </a:p>
         </p:txBody>
       </p:sp>
@@ -2179,7 +2181,7 @@
             <a:fld id="{1D8BD707-D9CF-40AE-B4C6-C98DA3205C09}" type="datetimeFigureOut">
               <a:rPr lang="en-US" smtClean="0"/>
               <a:pPr/>
-              <a:t>30/07/2020</a:t>
+              <a:t>8/7/2020</a:t>
             </a:fld>
             <a:endParaRPr lang="en-US"/>
           </a:p>
@@ -2269,10 +2271,9 @@
           <a:lstStyle/>
           <a:p>
             <a:r>
-              <a:rPr lang="en-US" smtClean="0"/>
+              <a:rPr lang="en-US"/>
               <a:t>Click to edit Master title style</a:t>
             </a:r>
-            <a:endParaRPr lang="en-US"/>
           </a:p>
         </p:txBody>
       </p:sp>
@@ -2294,7 +2295,7 @@
             <a:fld id="{1D8BD707-D9CF-40AE-B4C6-C98DA3205C09}" type="datetimeFigureOut">
               <a:rPr lang="en-US" smtClean="0"/>
               <a:pPr/>
-              <a:t>30/07/2020</a:t>
+              <a:t>8/7/2020</a:t>
             </a:fld>
             <a:endParaRPr lang="en-US"/>
           </a:p>
@@ -2386,7 +2387,7 @@
             <a:fld id="{1D8BD707-D9CF-40AE-B4C6-C98DA3205C09}" type="datetimeFigureOut">
               <a:rPr lang="en-US" smtClean="0"/>
               <a:pPr/>
-              <a:t>30/07/2020</a:t>
+              <a:t>8/7/2020</a:t>
             </a:fld>
             <a:endParaRPr lang="en-US"/>
           </a:p>
@@ -2485,10 +2486,9 @@
           </a:lstStyle>
           <a:p>
             <a:r>
-              <a:rPr lang="en-US" smtClean="0"/>
+              <a:rPr lang="en-US"/>
               <a:t>Click to edit Master title style</a:t>
             </a:r>
-            <a:endParaRPr lang="en-US"/>
           </a:p>
         </p:txBody>
       </p:sp>
@@ -2542,38 +2542,37 @@
           <a:p>
             <a:pPr lvl="0"/>
             <a:r>
-              <a:rPr lang="en-US" smtClean="0"/>
+              <a:rPr lang="en-US"/>
               <a:t>Click to edit Master text styles</a:t>
             </a:r>
           </a:p>
           <a:p>
             <a:pPr lvl="1"/>
             <a:r>
-              <a:rPr lang="en-US" smtClean="0"/>
+              <a:rPr lang="en-US"/>
               <a:t>Second level</a:t>
             </a:r>
           </a:p>
           <a:p>
             <a:pPr lvl="2"/>
             <a:r>
-              <a:rPr lang="en-US" smtClean="0"/>
+              <a:rPr lang="en-US"/>
               <a:t>Third level</a:t>
             </a:r>
           </a:p>
           <a:p>
             <a:pPr lvl="3"/>
             <a:r>
-              <a:rPr lang="en-US" smtClean="0"/>
+              <a:rPr lang="en-US"/>
               <a:t>Fourth level</a:t>
             </a:r>
           </a:p>
           <a:p>
             <a:pPr lvl="4"/>
             <a:r>
-              <a:rPr lang="en-US" smtClean="0"/>
+              <a:rPr lang="en-US"/>
               <a:t>Fifth level</a:t>
             </a:r>
-            <a:endParaRPr lang="en-US"/>
           </a:p>
         </p:txBody>
       </p:sp>
@@ -2636,7 +2635,7 @@
           <a:p>
             <a:pPr lvl="0"/>
             <a:r>
-              <a:rPr lang="en-US" smtClean="0"/>
+              <a:rPr lang="en-US"/>
               <a:t>Click to edit Master text styles</a:t>
             </a:r>
           </a:p>
@@ -2660,7 +2659,7 @@
             <a:fld id="{1D8BD707-D9CF-40AE-B4C6-C98DA3205C09}" type="datetimeFigureOut">
               <a:rPr lang="en-US" smtClean="0"/>
               <a:pPr/>
-              <a:t>30/07/2020</a:t>
+              <a:t>8/7/2020</a:t>
             </a:fld>
             <a:endParaRPr lang="en-US"/>
           </a:p>
@@ -2759,10 +2758,9 @@
           </a:lstStyle>
           <a:p>
             <a:r>
-              <a:rPr lang="en-US" smtClean="0"/>
+              <a:rPr lang="en-US"/>
               <a:t>Click to edit Master title style</a:t>
             </a:r>
-            <a:endParaRPr lang="en-US"/>
           </a:p>
         </p:txBody>
       </p:sp>
@@ -2886,7 +2884,7 @@
           <a:p>
             <a:pPr lvl="0"/>
             <a:r>
-              <a:rPr lang="en-US" smtClean="0"/>
+              <a:rPr lang="en-US"/>
               <a:t>Click to edit Master text styles</a:t>
             </a:r>
           </a:p>
@@ -2910,7 +2908,7 @@
             <a:fld id="{1D8BD707-D9CF-40AE-B4C6-C98DA3205C09}" type="datetimeFigureOut">
               <a:rPr lang="en-US" smtClean="0"/>
               <a:pPr/>
-              <a:t>30/07/2020</a:t>
+              <a:t>8/7/2020</a:t>
             </a:fld>
             <a:endParaRPr lang="en-US"/>
           </a:p>
@@ -3015,10 +3013,9 @@
           <a:lstStyle/>
           <a:p>
             <a:r>
-              <a:rPr lang="en-US" smtClean="0"/>
+              <a:rPr lang="en-US"/>
               <a:t>Click to edit Master title style</a:t>
             </a:r>
-            <a:endParaRPr lang="en-US"/>
           </a:p>
         </p:txBody>
       </p:sp>
@@ -3049,38 +3046,37 @@
           <a:p>
             <a:pPr lvl="0"/>
             <a:r>
-              <a:rPr lang="en-US" smtClean="0"/>
+              <a:rPr lang="en-US"/>
               <a:t>Click to edit Master text styles</a:t>
             </a:r>
           </a:p>
           <a:p>
             <a:pPr lvl="1"/>
             <a:r>
-              <a:rPr lang="en-US" smtClean="0"/>
+              <a:rPr lang="en-US"/>
               <a:t>Second level</a:t>
             </a:r>
           </a:p>
           <a:p>
             <a:pPr lvl="2"/>
             <a:r>
-              <a:rPr lang="en-US" smtClean="0"/>
+              <a:rPr lang="en-US"/>
               <a:t>Third level</a:t>
             </a:r>
           </a:p>
           <a:p>
             <a:pPr lvl="3"/>
             <a:r>
-              <a:rPr lang="en-US" smtClean="0"/>
+              <a:rPr lang="en-US"/>
               <a:t>Fourth level</a:t>
             </a:r>
           </a:p>
           <a:p>
             <a:pPr lvl="4"/>
             <a:r>
-              <a:rPr lang="en-US" smtClean="0"/>
+              <a:rPr lang="en-US"/>
               <a:t>Fifth level</a:t>
             </a:r>
-            <a:endParaRPr lang="en-US"/>
           </a:p>
         </p:txBody>
       </p:sp>
@@ -3120,7 +3116,7 @@
             <a:fld id="{1D8BD707-D9CF-40AE-B4C6-C98DA3205C09}" type="datetimeFigureOut">
               <a:rPr lang="en-US" smtClean="0"/>
               <a:pPr/>
-              <a:t>30/07/2020</a:t>
+              <a:t>8/7/2020</a:t>
             </a:fld>
             <a:endParaRPr lang="en-US"/>
           </a:p>
@@ -3533,7 +3529,7 @@
           <a:p>
             <a:pPr algn="ctr"/>
             <a:r>
-              <a:rPr lang="en-US" sz="2000" b="1" dirty="0" smtClean="0">
+              <a:rPr lang="en-US" sz="2000" b="1" dirty="0">
                 <a:solidFill>
                   <a:schemeClr val="tx1"/>
                 </a:solidFill>
@@ -3545,7 +3541,7 @@
           </a:p>
           <a:p>
             <a:pPr algn="ctr"/>
-            <a:endParaRPr lang="en-US" dirty="0" smtClean="0">
+            <a:endParaRPr lang="en-US" dirty="0">
               <a:solidFill>
                 <a:schemeClr val="tx1"/>
               </a:solidFill>
@@ -3554,18 +3550,64 @@
             </a:endParaRPr>
           </a:p>
           <a:p>
-            <a:r>
-              <a:rPr lang="en-US" dirty="0" smtClean="0">
+            <a:pPr algn="ctr"/>
+            <a:endParaRPr lang="en-US" dirty="0">
+              <a:solidFill>
+                <a:schemeClr val="tx1"/>
+              </a:solidFill>
+              <a:latin typeface="Times New Roman" pitchFamily="18" charset="0"/>
+              <a:cs typeface="Times New Roman" pitchFamily="18" charset="0"/>
+            </a:endParaRPr>
+          </a:p>
+          <a:p>
+            <a:r>
+              <a:rPr lang="en-US" dirty="0">
                 <a:solidFill>
                   <a:schemeClr val="tx1"/>
                 </a:solidFill>
                 <a:latin typeface="Times New Roman" pitchFamily="18" charset="0"/>
                 <a:cs typeface="Times New Roman" pitchFamily="18" charset="0"/>
               </a:rPr>
-              <a:t>Institution name:    </a:t>
+              <a:t>Theme:</a:t>
+            </a:r>
+          </a:p>
+          <a:p>
+            <a:r>
+              <a:rPr lang="en-US" dirty="0">
+                <a:solidFill>
+                  <a:schemeClr val="tx1"/>
+                </a:solidFill>
+                <a:latin typeface="Times New Roman" pitchFamily="18" charset="0"/>
+                <a:cs typeface="Times New Roman" pitchFamily="18" charset="0"/>
+              </a:rPr>
+              <a:t>Name of the Team: </a:t>
+            </a:r>
+          </a:p>
+          <a:p>
+            <a:r>
+              <a:rPr lang="en-US" dirty="0">
+                <a:solidFill>
+                  <a:schemeClr val="tx1"/>
+                </a:solidFill>
+                <a:latin typeface="Times New Roman" pitchFamily="18" charset="0"/>
+                <a:cs typeface="Times New Roman" pitchFamily="18" charset="0"/>
+              </a:rPr>
+              <a:t>Team Leader Name :                                            </a:t>
+            </a:r>
+          </a:p>
+          <a:p>
+            <a:r>
+              <a:rPr lang="en-US" dirty="0">
+                <a:solidFill>
+                  <a:schemeClr val="tx1"/>
+                </a:solidFill>
+                <a:latin typeface="Times New Roman" pitchFamily="18" charset="0"/>
+                <a:cs typeface="Times New Roman" pitchFamily="18" charset="0"/>
+              </a:rPr>
+              <a:t>Name of the Institute:    </a:t>
             </a:r>
             <a:br>
-              <a:rPr lang="en-US" dirty="0" smtClean="0">
+              <a:rPr lang="en-US" dirty="0">
                 <a:solidFill>
                   <a:schemeClr val="tx1"/>
                 </a:solidFill>
@@ -3574,17 +3616,28 @@
               </a:rPr>
             </a:br>
             <a:r>
-              <a:rPr lang="en-US" dirty="0" smtClean="0">
+              <a:rPr lang="en-US" dirty="0">
                 <a:solidFill>
                   <a:schemeClr val="tx1"/>
                 </a:solidFill>
                 <a:latin typeface="Times New Roman" pitchFamily="18" charset="0"/>
                 <a:cs typeface="Times New Roman" pitchFamily="18" charset="0"/>
               </a:rPr>
-              <a:t>Problem Statement :</a:t>
+              <a:t>Title </a:t>
+            </a:r>
+            <a:r>
+              <a:rPr lang="en-GB" sz="1800" dirty="0">
+                <a:solidFill>
+                  <a:schemeClr val="tx1"/>
+                </a:solidFill>
+                <a:effectLst/>
+                <a:latin typeface="Times New Roman" panose="02020603050405020304" pitchFamily="18" charset="0"/>
+                <a:ea typeface="Times New Roman" panose="02020603050405020304" pitchFamily="18" charset="0"/>
+              </a:rPr>
+              <a:t>of Project/Idea:</a:t>
             </a:r>
             <a:br>
-              <a:rPr lang="en-US" dirty="0" smtClean="0">
+              <a:rPr lang="en-US" dirty="0">
                 <a:solidFill>
                   <a:schemeClr val="tx1"/>
                 </a:solidFill>
@@ -3593,41 +3646,15 @@
               </a:rPr>
             </a:br>
             <a:r>
-              <a:rPr lang="en-US" dirty="0" smtClean="0">
+              <a:rPr lang="en-US" dirty="0">
                 <a:solidFill>
                   <a:schemeClr val="tx1"/>
                 </a:solidFill>
                 <a:latin typeface="Times New Roman" pitchFamily="18" charset="0"/>
                 <a:cs typeface="Times New Roman" pitchFamily="18" charset="0"/>
               </a:rPr>
-              <a:t>Team Name :</a:t>
-            </a:r>
-            <a:br>
-              <a:rPr lang="en-US" dirty="0" smtClean="0">
-                <a:solidFill>
-                  <a:schemeClr val="tx1"/>
-                </a:solidFill>
-                <a:latin typeface="Times New Roman" pitchFamily="18" charset="0"/>
-                <a:cs typeface="Times New Roman" pitchFamily="18" charset="0"/>
-              </a:rPr>
-            </a:br>
-            <a:r>
-              <a:rPr lang="en-US" dirty="0" smtClean="0">
-                <a:solidFill>
-                  <a:schemeClr val="tx1"/>
-                </a:solidFill>
-                <a:latin typeface="Times New Roman" pitchFamily="18" charset="0"/>
-                <a:cs typeface="Times New Roman" pitchFamily="18" charset="0"/>
-              </a:rPr>
-              <a:t>Team Leader Name : 								 </a:t>
-            </a:r>
-            <a:endParaRPr lang="en-US" dirty="0">
-              <a:solidFill>
-                <a:schemeClr val="tx1"/>
-              </a:solidFill>
-              <a:latin typeface="Times New Roman" pitchFamily="18" charset="0"/>
-              <a:cs typeface="Times New Roman" pitchFamily="18" charset="0"/>
-            </a:endParaRPr>
+              <a:t>								 </a:t>
+            </a:r>
           </a:p>
         </p:txBody>
       </p:sp>
@@ -3696,17 +3723,46 @@
           <a:bodyPr rtlCol="0" anchor="ctr"/>
           <a:lstStyle/>
           <a:p>
+            <a:pPr algn="ctr" defTabSz="457200"/>
+            <a:r>
+              <a:rPr lang="en-GB" sz="1800" dirty="0">
+                <a:solidFill>
+                  <a:schemeClr val="tx1"/>
+                </a:solidFill>
+                <a:effectLst/>
+              </a:rPr>
+              <a:t>Innovation:</a:t>
+            </a:r>
+            <a:endParaRPr lang="en-IN" sz="2400" dirty="0">
+              <a:solidFill>
+                <a:schemeClr val="tx1"/>
+              </a:solidFill>
+              <a:effectLst/>
+            </a:endParaRPr>
+          </a:p>
+          <a:p>
+            <a:pPr algn="ctr" defTabSz="457200"/>
+            <a:r>
+              <a:rPr lang="en-GB" sz="1800" dirty="0">
+                <a:solidFill>
+                  <a:schemeClr val="tx1"/>
+                </a:solidFill>
+                <a:effectLst/>
+              </a:rPr>
+              <a:t>How Innovative is the idea </a:t>
+            </a:r>
+            <a:endParaRPr lang="en-IN" sz="2400" dirty="0">
+              <a:solidFill>
+                <a:schemeClr val="tx1"/>
+              </a:solidFill>
+              <a:effectLst/>
+              <a:latin typeface="Calibri" panose="020F0502020204030204" pitchFamily="34" charset="0"/>
+              <a:ea typeface="Times New Roman" panose="02020603050405020304" pitchFamily="18" charset="0"/>
+              <a:cs typeface="Mangal" panose="02040503050203030202" pitchFamily="18" charset="0"/>
+            </a:endParaRPr>
+          </a:p>
+          <a:p>
             <a:pPr lvl="0" algn="ctr" defTabSz="457200"/>
-            <a:r>
-              <a:rPr lang="en-US" dirty="0" smtClean="0">
-                <a:solidFill>
-                  <a:prstClr val="black"/>
-                </a:solidFill>
-                <a:latin typeface="Times New Roman" pitchFamily="18" charset="0"/>
-                <a:cs typeface="Times New Roman" pitchFamily="18" charset="0"/>
-              </a:rPr>
-              <a:t>Describe your idea  / Solution / Prototype here</a:t>
-            </a:r>
             <a:endParaRPr lang="en-US" dirty="0">
               <a:solidFill>
                 <a:prstClr val="black"/>
@@ -3759,38 +3815,33 @@
           <a:p>
             <a:pPr lvl="0" algn="ctr" defTabSz="457200"/>
             <a:r>
-              <a:rPr lang="en-US" dirty="0" smtClean="0">
+              <a:rPr lang="en-GB" sz="1800" dirty="0">
                 <a:solidFill>
-                  <a:prstClr val="black"/>
+                  <a:schemeClr val="tx1"/>
                 </a:solidFill>
-                <a:latin typeface="Times New Roman" pitchFamily="18" charset="0"/>
-                <a:cs typeface="Times New Roman" pitchFamily="18" charset="0"/>
+                <a:effectLst/>
+                <a:latin typeface="Times New Roman" panose="02020603050405020304" pitchFamily="18" charset="0"/>
+                <a:ea typeface="Times New Roman" panose="02020603050405020304" pitchFamily="18" charset="0"/>
               </a:rPr>
-              <a:t>Describe</a:t>
-            </a:r>
-            <a:r>
-              <a:rPr lang="en-US" sz="1200" dirty="0" smtClean="0">
+              <a:t>Multidisciplinary:</a:t>
+            </a:r>
+          </a:p>
+          <a:p>
+            <a:pPr lvl="0" algn="ctr" defTabSz="457200"/>
+            <a:r>
+              <a:rPr lang="en-GB" sz="1800" dirty="0">
                 <a:solidFill>
-                  <a:prstClr val="white"/>
+                  <a:schemeClr val="tx1"/>
                 </a:solidFill>
-                <a:latin typeface="Times New Roman" pitchFamily="18" charset="0"/>
-                <a:cs typeface="Times New Roman" pitchFamily="18" charset="0"/>
+                <a:effectLst/>
+                <a:latin typeface="Times New Roman" panose="02020603050405020304" pitchFamily="18" charset="0"/>
+                <a:ea typeface="Times New Roman" panose="02020603050405020304" pitchFamily="18" charset="0"/>
               </a:rPr>
-              <a:t> </a:t>
-            </a:r>
-            <a:r>
-              <a:rPr lang="en-US" dirty="0" smtClean="0">
-                <a:solidFill>
-                  <a:prstClr val="black"/>
-                </a:solidFill>
-                <a:latin typeface="Times New Roman" pitchFamily="18" charset="0"/>
-                <a:cs typeface="Times New Roman" pitchFamily="18" charset="0"/>
-              </a:rPr>
-              <a:t>your Technology stack here</a:t>
+              <a:t>The well assembled team includes different members in each branch of expertise</a:t>
             </a:r>
             <a:endParaRPr lang="en-US" dirty="0">
               <a:solidFill>
-                <a:prstClr val="black"/>
+                <a:schemeClr val="tx1"/>
               </a:solidFill>
               <a:latin typeface="Times New Roman" pitchFamily="18" charset="0"/>
               <a:cs typeface="Times New Roman" pitchFamily="18" charset="0"/>
@@ -3807,7 +3858,7 @@
         <p:spPr>
           <a:xfrm>
             <a:off x="990600" y="762000"/>
-            <a:ext cx="3180081" cy="396241"/>
+            <a:ext cx="1329146" cy="369332"/>
           </a:xfrm>
           <a:prstGeom prst="rect">
             <a:avLst/>
@@ -3820,11 +3871,12 @@
           <a:lstStyle/>
           <a:p>
             <a:r>
-              <a:rPr lang="en-US" sz="2000" b="1" dirty="0" smtClean="0">
-                <a:latin typeface="Times New Roman" pitchFamily="18" charset="0"/>
-                <a:cs typeface="Times New Roman" pitchFamily="18" charset="0"/>
+              <a:rPr lang="en-GB" sz="1800" dirty="0">
+                <a:effectLst/>
+                <a:latin typeface="Times New Roman" panose="02020603050405020304" pitchFamily="18" charset="0"/>
+                <a:ea typeface="Times New Roman" panose="02020603050405020304" pitchFamily="18" charset="0"/>
               </a:rPr>
-              <a:t>IDEA/APPROACH DETAILS</a:t>
+              <a:t>Idea &amp;Team</a:t>
             </a:r>
             <a:endParaRPr lang="en-US" sz="2000" b="1" dirty="0">
               <a:latin typeface="Times New Roman" pitchFamily="18" charset="0"/>
@@ -3866,7 +3918,7 @@
         </p:nvSpPr>
         <p:spPr>
           <a:xfrm>
-            <a:off x="990600" y="1524000"/>
+            <a:off x="951723" y="1119464"/>
             <a:ext cx="7162800" cy="1600200"/>
           </a:xfrm>
           <a:prstGeom prst="rect">
@@ -3900,18 +3952,33 @@
           <a:p>
             <a:pPr lvl="0" algn="ctr" defTabSz="457200"/>
             <a:r>
-              <a:rPr lang="en-US" dirty="0" smtClean="0">
+              <a:rPr lang="en-GB" sz="1800" dirty="0">
                 <a:solidFill>
-                  <a:prstClr val="black"/>
+                  <a:schemeClr val="tx1"/>
                 </a:solidFill>
-                <a:latin typeface="Times New Roman" pitchFamily="18" charset="0"/>
-                <a:cs typeface="Times New Roman" pitchFamily="18" charset="0"/>
+                <a:effectLst/>
+                <a:latin typeface="Times New Roman" panose="02020603050405020304" pitchFamily="18" charset="0"/>
+                <a:ea typeface="Times New Roman" panose="02020603050405020304" pitchFamily="18" charset="0"/>
               </a:rPr>
-              <a:t>Describe your Use Cases here</a:t>
+              <a:t>Creativity:</a:t>
+            </a:r>
+          </a:p>
+          <a:p>
+            <a:pPr lvl="0" algn="ctr" defTabSz="457200"/>
+            <a:r>
+              <a:rPr lang="en-GB" sz="1800" dirty="0">
+                <a:solidFill>
+                  <a:schemeClr val="tx1"/>
+                </a:solidFill>
+                <a:effectLst/>
+                <a:latin typeface="Times New Roman" panose="02020603050405020304" pitchFamily="18" charset="0"/>
+                <a:ea typeface="Times New Roman" panose="02020603050405020304" pitchFamily="18" charset="0"/>
+              </a:rPr>
+              <a:t>How creative the solution ?</a:t>
             </a:r>
             <a:endParaRPr lang="en-US" dirty="0">
               <a:solidFill>
-                <a:prstClr val="black"/>
+                <a:schemeClr val="tx1"/>
               </a:solidFill>
               <a:latin typeface="Times New Roman" pitchFamily="18" charset="0"/>
               <a:cs typeface="Times New Roman" pitchFamily="18" charset="0"/>
@@ -3927,7 +3994,7 @@
         </p:nvSpPr>
         <p:spPr>
           <a:xfrm>
-            <a:off x="990600" y="3505200"/>
+            <a:off x="951723" y="3106212"/>
             <a:ext cx="7162800" cy="1600200"/>
           </a:xfrm>
           <a:prstGeom prst="rect">
@@ -3961,38 +4028,33 @@
           <a:p>
             <a:pPr lvl="0" algn="ctr" defTabSz="457200"/>
             <a:r>
-              <a:rPr lang="en-US" dirty="0" smtClean="0">
+              <a:rPr lang="en-GB" sz="1800" dirty="0">
                 <a:solidFill>
-                  <a:prstClr val="black"/>
+                  <a:schemeClr val="tx1"/>
                 </a:solidFill>
-                <a:latin typeface="Times New Roman" pitchFamily="18" charset="0"/>
-                <a:cs typeface="Times New Roman" pitchFamily="18" charset="0"/>
+                <a:effectLst/>
+                <a:latin typeface="Times New Roman" panose="02020603050405020304" pitchFamily="18" charset="0"/>
+                <a:ea typeface="Times New Roman" panose="02020603050405020304" pitchFamily="18" charset="0"/>
               </a:rPr>
-              <a:t>Describe</a:t>
-            </a:r>
-            <a:r>
-              <a:rPr lang="en-US" sz="1200" dirty="0" smtClean="0">
+              <a:t>Functionality:</a:t>
+            </a:r>
+          </a:p>
+          <a:p>
+            <a:pPr lvl="0" algn="ctr" defTabSz="457200"/>
+            <a:r>
+              <a:rPr lang="en-GB" sz="1800" dirty="0">
                 <a:solidFill>
-                  <a:prstClr val="white"/>
+                  <a:schemeClr val="tx1"/>
                 </a:solidFill>
-                <a:latin typeface="Times New Roman" pitchFamily="18" charset="0"/>
-                <a:cs typeface="Times New Roman" pitchFamily="18" charset="0"/>
+                <a:effectLst/>
+                <a:latin typeface="Times New Roman" panose="02020603050405020304" pitchFamily="18" charset="0"/>
+                <a:ea typeface="Times New Roman" panose="02020603050405020304" pitchFamily="18" charset="0"/>
               </a:rPr>
-              <a:t> </a:t>
-            </a:r>
-            <a:r>
-              <a:rPr lang="en-US" dirty="0" smtClean="0">
-                <a:solidFill>
-                  <a:prstClr val="black"/>
-                </a:solidFill>
-                <a:latin typeface="Times New Roman" pitchFamily="18" charset="0"/>
-                <a:cs typeface="Times New Roman" pitchFamily="18" charset="0"/>
-              </a:rPr>
-              <a:t>your Dependencies / Show stopper here</a:t>
+              <a:t>How technically sound is this project. Do the team has a functional prototype?</a:t>
             </a:r>
             <a:endParaRPr lang="en-US" dirty="0">
               <a:solidFill>
-                <a:prstClr val="black"/>
+                <a:schemeClr val="tx1"/>
               </a:solidFill>
               <a:latin typeface="Times New Roman" pitchFamily="18" charset="0"/>
               <a:cs typeface="Times New Roman" pitchFamily="18" charset="0"/>
@@ -4002,33 +4064,115 @@
       </p:sp>
       <p:sp>
         <p:nvSpPr>
-          <p:cNvPr id="1048597" name="Rectangle 6"/>
-          <p:cNvSpPr/>
+          <p:cNvPr id="8" name="TextBox 7">
+            <a:extLst>
+              <a:ext uri="{FF2B5EF4-FFF2-40B4-BE49-F238E27FC236}">
+                <a16:creationId xmlns:a16="http://schemas.microsoft.com/office/drawing/2014/main" id="{10E5D097-2E39-4F92-896B-630240C0B15C}"/>
+              </a:ext>
+            </a:extLst>
+          </p:cNvPr>
+          <p:cNvSpPr txBox="1"/>
           <p:nvPr/>
         </p:nvSpPr>
         <p:spPr>
           <a:xfrm>
-            <a:off x="990600" y="838200"/>
-            <a:ext cx="2900680" cy="358140"/>
+            <a:off x="957943" y="736346"/>
+            <a:ext cx="4572000" cy="369332"/>
           </a:xfrm>
           <a:prstGeom prst="rect">
             <a:avLst/>
           </a:prstGeom>
+          <a:noFill/>
         </p:spPr>
         <p:txBody>
-          <a:bodyPr wrap="none">
+          <a:bodyPr wrap="square">
             <a:spAutoFit/>
           </a:bodyPr>
           <a:lstStyle/>
           <a:p>
             <a:r>
-              <a:rPr lang="en-US" b="1" dirty="0" smtClean="0">
-                <a:latin typeface="Times New Roman" pitchFamily="18" charset="0"/>
-                <a:cs typeface="Times New Roman" pitchFamily="18" charset="0"/>
+              <a:rPr lang="en-IN" dirty="0"/>
+              <a:t>Technology</a:t>
+            </a:r>
+          </a:p>
+        </p:txBody>
+      </p:sp>
+      <p:sp>
+        <p:nvSpPr>
+          <p:cNvPr id="7" name="Rectangle 3">
+            <a:extLst>
+              <a:ext uri="{FF2B5EF4-FFF2-40B4-BE49-F238E27FC236}">
+                <a16:creationId xmlns:a16="http://schemas.microsoft.com/office/drawing/2014/main" id="{E992D09F-D5A4-47F3-A043-80B36A378559}"/>
+              </a:ext>
+            </a:extLst>
+          </p:cNvPr>
+          <p:cNvSpPr/>
+          <p:nvPr/>
+        </p:nvSpPr>
+        <p:spPr>
+          <a:xfrm>
+            <a:off x="950168" y="4938436"/>
+            <a:ext cx="7162800" cy="1600200"/>
+          </a:xfrm>
+          <a:prstGeom prst="rect">
+            <a:avLst/>
+          </a:prstGeom>
+          <a:solidFill>
+            <a:schemeClr val="accent6">
+              <a:lumMod val="75000"/>
+            </a:schemeClr>
+          </a:solidFill>
+        </p:spPr>
+        <p:style>
+          <a:lnRef idx="2">
+            <a:schemeClr val="accent1">
+              <a:shade val="50000"/>
+            </a:schemeClr>
+          </a:lnRef>
+          <a:fillRef idx="1">
+            <a:schemeClr val="accent1"/>
+          </a:fillRef>
+          <a:effectRef idx="0">
+            <a:schemeClr val="accent1"/>
+          </a:effectRef>
+          <a:fontRef idx="minor">
+            <a:schemeClr val="lt1"/>
+          </a:fontRef>
+        </p:style>
+        <p:txBody>
+          <a:bodyPr rtlCol="0" anchor="ctr"/>
+          <a:lstStyle/>
+          <a:p>
+            <a:pPr lvl="0" algn="ctr" defTabSz="457200"/>
+            <a:r>
+              <a:rPr lang="en-GB" sz="1800" dirty="0">
+                <a:solidFill>
+                  <a:schemeClr val="tx1"/>
+                </a:solidFill>
+                <a:effectLst/>
+                <a:latin typeface="Times New Roman" panose="02020603050405020304" pitchFamily="18" charset="0"/>
+                <a:ea typeface="Times New Roman" panose="02020603050405020304" pitchFamily="18" charset="0"/>
               </a:rPr>
-              <a:t>IDEA/APPROACH DETAILS</a:t>
-            </a:r>
-            <a:endParaRPr lang="en-US" b="1" dirty="0">
+              <a:t>Efficiency:</a:t>
+            </a:r>
+          </a:p>
+          <a:p>
+            <a:pPr lvl="0" algn="ctr" defTabSz="457200"/>
+            <a:r>
+              <a:rPr lang="en-GB" sz="1800" dirty="0">
+                <a:solidFill>
+                  <a:schemeClr val="tx1"/>
+                </a:solidFill>
+                <a:effectLst/>
+                <a:latin typeface="Times New Roman" panose="02020603050405020304" pitchFamily="18" charset="0"/>
+                <a:ea typeface="Times New Roman" panose="02020603050405020304" pitchFamily="18" charset="0"/>
+              </a:rPr>
+              <a:t>How well does the project make the use of chosen technology?</a:t>
+            </a:r>
+            <a:endParaRPr lang="en-US" dirty="0">
+              <a:solidFill>
+                <a:schemeClr val="tx1"/>
+              </a:solidFill>
               <a:latin typeface="Times New Roman" pitchFamily="18" charset="0"/>
               <a:cs typeface="Times New Roman" pitchFamily="18" charset="0"/>
             </a:endParaRPr>
@@ -4036,6 +4180,310 @@
         </p:txBody>
       </p:sp>
     </p:spTree>
+  </p:cSld>
+  <p:clrMapOvr>
+    <a:masterClrMapping/>
+  </p:clrMapOvr>
+</p:sld>
+</file>
+
+<file path=ppt/slides/slide4.xml><?xml version="1.0" encoding="utf-8"?>
+<p:sld xmlns:a="http://schemas.openxmlformats.org/drawingml/2006/main" xmlns:r="http://schemas.openxmlformats.org/officeDocument/2006/relationships" xmlns:p="http://schemas.openxmlformats.org/presentationml/2006/main">
+  <p:cSld>
+    <p:spTree>
+      <p:nvGrpSpPr>
+        <p:cNvPr id="1" name=""/>
+        <p:cNvGrpSpPr/>
+        <p:nvPr/>
+      </p:nvGrpSpPr>
+      <p:grpSpPr>
+        <a:xfrm>
+          <a:off x="0" y="0"/>
+          <a:ext cx="0" cy="0"/>
+          <a:chOff x="0" y="0"/>
+          <a:chExt cx="0" cy="0"/>
+        </a:xfrm>
+      </p:grpSpPr>
+      <p:sp>
+        <p:nvSpPr>
+          <p:cNvPr id="13" name="TextBox 12">
+            <a:extLst>
+              <a:ext uri="{FF2B5EF4-FFF2-40B4-BE49-F238E27FC236}">
+                <a16:creationId xmlns:a16="http://schemas.microsoft.com/office/drawing/2014/main" id="{1B524555-C1A0-4EAD-BABF-85EBCB872661}"/>
+              </a:ext>
+            </a:extLst>
+          </p:cNvPr>
+          <p:cNvSpPr txBox="1"/>
+          <p:nvPr/>
+        </p:nvSpPr>
+        <p:spPr>
+          <a:xfrm>
+            <a:off x="838200" y="382351"/>
+            <a:ext cx="4572000" cy="369332"/>
+          </a:xfrm>
+          <a:prstGeom prst="rect">
+            <a:avLst/>
+          </a:prstGeom>
+          <a:noFill/>
+        </p:spPr>
+        <p:txBody>
+          <a:bodyPr wrap="square">
+            <a:spAutoFit/>
+          </a:bodyPr>
+          <a:lstStyle/>
+          <a:p>
+            <a:r>
+              <a:rPr lang="en-IN" dirty="0"/>
+              <a:t>Entrepreneurship</a:t>
+            </a:r>
+          </a:p>
+        </p:txBody>
+      </p:sp>
+      <p:sp>
+        <p:nvSpPr>
+          <p:cNvPr id="19" name="Rectangle 3">
+            <a:extLst>
+              <a:ext uri="{FF2B5EF4-FFF2-40B4-BE49-F238E27FC236}">
+                <a16:creationId xmlns:a16="http://schemas.microsoft.com/office/drawing/2014/main" id="{8D48CF3A-1C50-45B8-A705-062EDE7607EC}"/>
+              </a:ext>
+            </a:extLst>
+          </p:cNvPr>
+          <p:cNvSpPr/>
+          <p:nvPr/>
+        </p:nvSpPr>
+        <p:spPr>
+          <a:xfrm>
+            <a:off x="990600" y="1118119"/>
+            <a:ext cx="7162800" cy="1600200"/>
+          </a:xfrm>
+          <a:prstGeom prst="rect">
+            <a:avLst/>
+          </a:prstGeom>
+          <a:solidFill>
+            <a:schemeClr val="accent6">
+              <a:lumMod val="75000"/>
+            </a:schemeClr>
+          </a:solidFill>
+        </p:spPr>
+        <p:style>
+          <a:lnRef idx="2">
+            <a:schemeClr val="accent1">
+              <a:shade val="50000"/>
+            </a:schemeClr>
+          </a:lnRef>
+          <a:fillRef idx="1">
+            <a:schemeClr val="accent1"/>
+          </a:fillRef>
+          <a:effectRef idx="0">
+            <a:schemeClr val="accent1"/>
+          </a:effectRef>
+          <a:fontRef idx="minor">
+            <a:schemeClr val="lt1"/>
+          </a:fontRef>
+        </p:style>
+        <p:txBody>
+          <a:bodyPr rtlCol="0" anchor="ctr"/>
+          <a:lstStyle/>
+          <a:p>
+            <a:pPr lvl="0" algn="ctr" defTabSz="457200"/>
+            <a:r>
+              <a:rPr lang="en-GB" sz="1800" dirty="0">
+                <a:solidFill>
+                  <a:schemeClr val="tx1"/>
+                </a:solidFill>
+                <a:effectLst/>
+                <a:latin typeface="Times New Roman" panose="02020603050405020304" pitchFamily="18" charset="0"/>
+                <a:ea typeface="Times New Roman" panose="02020603050405020304" pitchFamily="18" charset="0"/>
+              </a:rPr>
+              <a:t>Practicality:</a:t>
+            </a:r>
+          </a:p>
+          <a:p>
+            <a:pPr lvl="0" algn="ctr" defTabSz="457200"/>
+            <a:r>
+              <a:rPr lang="en-GB" sz="1800" dirty="0">
+                <a:solidFill>
+                  <a:schemeClr val="tx1"/>
+                </a:solidFill>
+                <a:effectLst/>
+                <a:latin typeface="Times New Roman" panose="02020603050405020304" pitchFamily="18" charset="0"/>
+                <a:ea typeface="Times New Roman" panose="02020603050405020304" pitchFamily="18" charset="0"/>
+              </a:rPr>
+              <a:t>Is the project is practical in business point of view?</a:t>
+            </a:r>
+            <a:endParaRPr lang="en-US" dirty="0">
+              <a:solidFill>
+                <a:schemeClr val="tx1"/>
+              </a:solidFill>
+              <a:latin typeface="Times New Roman" pitchFamily="18" charset="0"/>
+              <a:cs typeface="Times New Roman" pitchFamily="18" charset="0"/>
+            </a:endParaRPr>
+          </a:p>
+        </p:txBody>
+      </p:sp>
+      <p:sp>
+        <p:nvSpPr>
+          <p:cNvPr id="21" name="Rectangle 3">
+            <a:extLst>
+              <a:ext uri="{FF2B5EF4-FFF2-40B4-BE49-F238E27FC236}">
+                <a16:creationId xmlns:a16="http://schemas.microsoft.com/office/drawing/2014/main" id="{3FCB215F-FE5E-4A7E-9158-013FE651F313}"/>
+              </a:ext>
+            </a:extLst>
+          </p:cNvPr>
+          <p:cNvSpPr/>
+          <p:nvPr/>
+        </p:nvSpPr>
+        <p:spPr>
+          <a:xfrm>
+            <a:off x="951723" y="2971800"/>
+            <a:ext cx="7162800" cy="1600200"/>
+          </a:xfrm>
+          <a:prstGeom prst="rect">
+            <a:avLst/>
+          </a:prstGeom>
+          <a:solidFill>
+            <a:schemeClr val="accent6">
+              <a:lumMod val="75000"/>
+            </a:schemeClr>
+          </a:solidFill>
+        </p:spPr>
+        <p:style>
+          <a:lnRef idx="2">
+            <a:schemeClr val="accent1">
+              <a:shade val="50000"/>
+            </a:schemeClr>
+          </a:lnRef>
+          <a:fillRef idx="1">
+            <a:schemeClr val="accent1"/>
+          </a:fillRef>
+          <a:effectRef idx="0">
+            <a:schemeClr val="accent1"/>
+          </a:effectRef>
+          <a:fontRef idx="minor">
+            <a:schemeClr val="lt1"/>
+          </a:fontRef>
+        </p:style>
+        <p:txBody>
+          <a:bodyPr rtlCol="0" anchor="ctr"/>
+          <a:lstStyle/>
+          <a:p>
+            <a:pPr lvl="0" algn="ctr" defTabSz="457200"/>
+            <a:r>
+              <a:rPr lang="en-GB" sz="1800" dirty="0">
+                <a:solidFill>
+                  <a:schemeClr val="tx1"/>
+                </a:solidFill>
+                <a:effectLst/>
+                <a:latin typeface="Times New Roman" panose="02020603050405020304" pitchFamily="18" charset="0"/>
+                <a:ea typeface="Times New Roman" panose="02020603050405020304" pitchFamily="18" charset="0"/>
+              </a:rPr>
+              <a:t>Scalability:</a:t>
+            </a:r>
+          </a:p>
+          <a:p>
+            <a:pPr lvl="0" algn="ctr" defTabSz="457200"/>
+            <a:r>
+              <a:rPr lang="en-GB" sz="1800" dirty="0">
+                <a:solidFill>
+                  <a:schemeClr val="tx1"/>
+                </a:solidFill>
+                <a:effectLst/>
+                <a:latin typeface="Times New Roman" panose="02020603050405020304" pitchFamily="18" charset="0"/>
+                <a:ea typeface="Times New Roman" panose="02020603050405020304" pitchFamily="18" charset="0"/>
+              </a:rPr>
+              <a:t>Is it scalable? Would there will demand for this project?</a:t>
+            </a:r>
+            <a:endParaRPr lang="en-US" dirty="0">
+              <a:solidFill>
+                <a:schemeClr val="tx1"/>
+              </a:solidFill>
+              <a:latin typeface="Times New Roman" pitchFamily="18" charset="0"/>
+              <a:cs typeface="Times New Roman" pitchFamily="18" charset="0"/>
+            </a:endParaRPr>
+          </a:p>
+        </p:txBody>
+      </p:sp>
+      <p:sp>
+        <p:nvSpPr>
+          <p:cNvPr id="23" name="Rectangle 3">
+            <a:extLst>
+              <a:ext uri="{FF2B5EF4-FFF2-40B4-BE49-F238E27FC236}">
+                <a16:creationId xmlns:a16="http://schemas.microsoft.com/office/drawing/2014/main" id="{27E30A90-5752-4B09-B47C-4478FA018C08}"/>
+              </a:ext>
+            </a:extLst>
+          </p:cNvPr>
+          <p:cNvSpPr/>
+          <p:nvPr/>
+        </p:nvSpPr>
+        <p:spPr>
+          <a:xfrm>
+            <a:off x="962609" y="4875449"/>
+            <a:ext cx="7162800" cy="1600200"/>
+          </a:xfrm>
+          <a:prstGeom prst="rect">
+            <a:avLst/>
+          </a:prstGeom>
+          <a:solidFill>
+            <a:schemeClr val="accent6">
+              <a:lumMod val="75000"/>
+            </a:schemeClr>
+          </a:solidFill>
+        </p:spPr>
+        <p:style>
+          <a:lnRef idx="2">
+            <a:schemeClr val="accent1">
+              <a:shade val="50000"/>
+            </a:schemeClr>
+          </a:lnRef>
+          <a:fillRef idx="1">
+            <a:schemeClr val="accent1"/>
+          </a:fillRef>
+          <a:effectRef idx="0">
+            <a:schemeClr val="accent1"/>
+          </a:effectRef>
+          <a:fontRef idx="minor">
+            <a:schemeClr val="lt1"/>
+          </a:fontRef>
+        </p:style>
+        <p:txBody>
+          <a:bodyPr rtlCol="0" anchor="ctr"/>
+          <a:lstStyle/>
+          <a:p>
+            <a:pPr lvl="0" algn="ctr" defTabSz="457200"/>
+            <a:r>
+              <a:rPr lang="en-GB" sz="1800" dirty="0">
+                <a:solidFill>
+                  <a:schemeClr val="tx1"/>
+                </a:solidFill>
+                <a:effectLst/>
+                <a:latin typeface="Times New Roman" panose="02020603050405020304" pitchFamily="18" charset="0"/>
+                <a:ea typeface="Times New Roman" panose="02020603050405020304" pitchFamily="18" charset="0"/>
+              </a:rPr>
+              <a:t>Originality:</a:t>
+            </a:r>
+          </a:p>
+          <a:p>
+            <a:pPr lvl="0" algn="ctr" defTabSz="457200"/>
+            <a:r>
+              <a:rPr lang="en-GB" sz="1800" dirty="0">
+                <a:solidFill>
+                  <a:schemeClr val="tx1"/>
+                </a:solidFill>
+                <a:effectLst/>
+                <a:latin typeface="Times New Roman" panose="02020603050405020304" pitchFamily="18" charset="0"/>
+                <a:ea typeface="Times New Roman" panose="02020603050405020304" pitchFamily="18" charset="0"/>
+              </a:rPr>
+              <a:t>Is this project is unique? Will it stand out from the competition?</a:t>
+            </a:r>
+          </a:p>
+        </p:txBody>
+      </p:sp>
+    </p:spTree>
+    <p:extLst>
+      <p:ext uri="{BB962C8B-B14F-4D97-AF65-F5344CB8AC3E}">
+        <p14:creationId xmlns:p14="http://schemas.microsoft.com/office/powerpoint/2010/main" val="1223899660"/>
+      </p:ext>
+    </p:extLst>
   </p:cSld>
   <p:clrMapOvr>
     <a:masterClrMapping/>

</xml_diff>